<commit_message>
Fix UserGuide and DeveloperGuide
</commit_message>
<xml_diff>
--- a/docs/diagrams/TrackSequenceDiagram.pptx
+++ b/docs/diagrams/TrackSequenceDiagram.pptx
@@ -208,7 +208,7 @@
           <a:p>
             <a:fld id="{F5CC4B3F-88C1-4FFA-B1B6-F41C21DC6924}" type="datetimeFigureOut">
               <a:rPr lang="en-US" smtClean="0"/>
-              <a:t>11/1/2018</a:t>
+              <a:t>11/12/2018</a:t>
             </a:fld>
             <a:endParaRPr lang="en-US"/>
           </a:p>
@@ -649,7 +649,7 @@
           <a:p>
             <a:fld id="{78C97017-6FC3-485B-9764-EAC9E56C1D49}" type="datetimeFigureOut">
               <a:rPr lang="en-US" smtClean="0"/>
-              <a:t>11/1/2018</a:t>
+              <a:t>11/12/2018</a:t>
             </a:fld>
             <a:endParaRPr lang="en-US"/>
           </a:p>
@@ -812,7 +812,7 @@
           <a:p>
             <a:fld id="{78C97017-6FC3-485B-9764-EAC9E56C1D49}" type="datetimeFigureOut">
               <a:rPr lang="en-US" smtClean="0"/>
-              <a:t>11/1/2018</a:t>
+              <a:t>11/12/2018</a:t>
             </a:fld>
             <a:endParaRPr lang="en-US"/>
           </a:p>
@@ -985,7 +985,7 @@
           <a:p>
             <a:fld id="{78C97017-6FC3-485B-9764-EAC9E56C1D49}" type="datetimeFigureOut">
               <a:rPr lang="en-US" smtClean="0"/>
-              <a:t>11/1/2018</a:t>
+              <a:t>11/12/2018</a:t>
             </a:fld>
             <a:endParaRPr lang="en-US"/>
           </a:p>
@@ -1148,7 +1148,7 @@
           <a:p>
             <a:fld id="{78C97017-6FC3-485B-9764-EAC9E56C1D49}" type="datetimeFigureOut">
               <a:rPr lang="en-US" smtClean="0"/>
-              <a:t>11/1/2018</a:t>
+              <a:t>11/12/2018</a:t>
             </a:fld>
             <a:endParaRPr lang="en-US"/>
           </a:p>
@@ -1388,7 +1388,7 @@
           <a:p>
             <a:fld id="{78C97017-6FC3-485B-9764-EAC9E56C1D49}" type="datetimeFigureOut">
               <a:rPr lang="en-US" smtClean="0"/>
-              <a:t>11/1/2018</a:t>
+              <a:t>11/12/2018</a:t>
             </a:fld>
             <a:endParaRPr lang="en-US"/>
           </a:p>
@@ -1668,7 +1668,7 @@
           <a:p>
             <a:fld id="{78C97017-6FC3-485B-9764-EAC9E56C1D49}" type="datetimeFigureOut">
               <a:rPr lang="en-US" smtClean="0"/>
-              <a:t>11/1/2018</a:t>
+              <a:t>11/12/2018</a:t>
             </a:fld>
             <a:endParaRPr lang="en-US"/>
           </a:p>
@@ -2082,7 +2082,7 @@
           <a:p>
             <a:fld id="{78C97017-6FC3-485B-9764-EAC9E56C1D49}" type="datetimeFigureOut">
               <a:rPr lang="en-US" smtClean="0"/>
-              <a:t>11/1/2018</a:t>
+              <a:t>11/12/2018</a:t>
             </a:fld>
             <a:endParaRPr lang="en-US"/>
           </a:p>
@@ -2194,7 +2194,7 @@
           <a:p>
             <a:fld id="{78C97017-6FC3-485B-9764-EAC9E56C1D49}" type="datetimeFigureOut">
               <a:rPr lang="en-US" smtClean="0"/>
-              <a:t>11/1/2018</a:t>
+              <a:t>11/12/2018</a:t>
             </a:fld>
             <a:endParaRPr lang="en-US"/>
           </a:p>
@@ -2284,7 +2284,7 @@
           <a:p>
             <a:fld id="{78C97017-6FC3-485B-9764-EAC9E56C1D49}" type="datetimeFigureOut">
               <a:rPr lang="en-US" smtClean="0"/>
-              <a:t>11/1/2018</a:t>
+              <a:t>11/12/2018</a:t>
             </a:fld>
             <a:endParaRPr lang="en-US"/>
           </a:p>
@@ -2554,7 +2554,7 @@
           <a:p>
             <a:fld id="{78C97017-6FC3-485B-9764-EAC9E56C1D49}" type="datetimeFigureOut">
               <a:rPr lang="en-US" smtClean="0"/>
-              <a:t>11/1/2018</a:t>
+              <a:t>11/12/2018</a:t>
             </a:fld>
             <a:endParaRPr lang="en-US"/>
           </a:p>
@@ -2801,7 +2801,7 @@
           <a:p>
             <a:fld id="{78C97017-6FC3-485B-9764-EAC9E56C1D49}" type="datetimeFigureOut">
               <a:rPr lang="en-US" smtClean="0"/>
-              <a:t>11/1/2018</a:t>
+              <a:t>11/12/2018</a:t>
             </a:fld>
             <a:endParaRPr lang="en-US"/>
           </a:p>
@@ -3007,7 +3007,7 @@
           <a:p>
             <a:fld id="{78C97017-6FC3-485B-9764-EAC9E56C1D49}" type="datetimeFigureOut">
               <a:rPr lang="en-US" smtClean="0"/>
-              <a:t>11/1/2018</a:t>
+              <a:t>11/12/2018</a:t>
             </a:fld>
             <a:endParaRPr lang="en-US"/>
           </a:p>
@@ -4353,7 +4353,7 @@
         </p:nvSpPr>
         <p:spPr>
           <a:xfrm>
-            <a:off x="5463990" y="2390041"/>
+            <a:off x="5465895" y="2456825"/>
             <a:ext cx="258404" cy="261610"/>
           </a:xfrm>
           <a:prstGeom prst="rect">

</xml_diff>